<commit_message>
anomalia de campo total
</commit_message>
<xml_diff>
--- a/slides/1_apresentacao.pptx
+++ b/slides/1_apresentacao.pptx
@@ -13,7 +13,7 @@
     <p:sldId id="277" r:id="rId7"/>
     <p:sldId id="282" r:id="rId8"/>
     <p:sldId id="279" r:id="rId9"/>
-    <p:sldId id="285" r:id="rId10"/>
+    <p:sldId id="287" r:id="rId10"/>
     <p:sldId id="283" r:id="rId11"/>
     <p:sldId id="284" r:id="rId12"/>
     <p:sldId id="286" r:id="rId13"/>
@@ -303,7 +303,7 @@
           <a:p>
             <a:fld id="{F36E7A87-AD80-4CF8-A2FC-E38A060CEB8C}" type="datetimeFigureOut">
               <a:rPr lang="pt-BR" smtClean="0"/>
-              <a:t>10/10/2016</a:t>
+              <a:t>13/10/2016</a:t>
             </a:fld>
             <a:endParaRPr lang="pt-BR"/>
           </a:p>
@@ -473,7 +473,7 @@
           <a:p>
             <a:fld id="{F36E7A87-AD80-4CF8-A2FC-E38A060CEB8C}" type="datetimeFigureOut">
               <a:rPr lang="pt-BR" smtClean="0"/>
-              <a:t>10/10/2016</a:t>
+              <a:t>13/10/2016</a:t>
             </a:fld>
             <a:endParaRPr lang="pt-BR"/>
           </a:p>
@@ -653,7 +653,7 @@
           <a:p>
             <a:fld id="{F36E7A87-AD80-4CF8-A2FC-E38A060CEB8C}" type="datetimeFigureOut">
               <a:rPr lang="pt-BR" smtClean="0"/>
-              <a:t>10/10/2016</a:t>
+              <a:t>13/10/2016</a:t>
             </a:fld>
             <a:endParaRPr lang="pt-BR"/>
           </a:p>
@@ -823,7 +823,7 @@
           <a:p>
             <a:fld id="{F36E7A87-AD80-4CF8-A2FC-E38A060CEB8C}" type="datetimeFigureOut">
               <a:rPr lang="pt-BR" smtClean="0"/>
-              <a:t>10/10/2016</a:t>
+              <a:t>13/10/2016</a:t>
             </a:fld>
             <a:endParaRPr lang="pt-BR"/>
           </a:p>
@@ -1069,7 +1069,7 @@
           <a:p>
             <a:fld id="{F36E7A87-AD80-4CF8-A2FC-E38A060CEB8C}" type="datetimeFigureOut">
               <a:rPr lang="pt-BR" smtClean="0"/>
-              <a:t>10/10/2016</a:t>
+              <a:t>13/10/2016</a:t>
             </a:fld>
             <a:endParaRPr lang="pt-BR"/>
           </a:p>
@@ -1357,7 +1357,7 @@
           <a:p>
             <a:fld id="{F36E7A87-AD80-4CF8-A2FC-E38A060CEB8C}" type="datetimeFigureOut">
               <a:rPr lang="pt-BR" smtClean="0"/>
-              <a:t>10/10/2016</a:t>
+              <a:t>13/10/2016</a:t>
             </a:fld>
             <a:endParaRPr lang="pt-BR"/>
           </a:p>
@@ -1779,7 +1779,7 @@
           <a:p>
             <a:fld id="{F36E7A87-AD80-4CF8-A2FC-E38A060CEB8C}" type="datetimeFigureOut">
               <a:rPr lang="pt-BR" smtClean="0"/>
-              <a:t>10/10/2016</a:t>
+              <a:t>13/10/2016</a:t>
             </a:fld>
             <a:endParaRPr lang="pt-BR"/>
           </a:p>
@@ -1897,7 +1897,7 @@
           <a:p>
             <a:fld id="{F36E7A87-AD80-4CF8-A2FC-E38A060CEB8C}" type="datetimeFigureOut">
               <a:rPr lang="pt-BR" smtClean="0"/>
-              <a:t>10/10/2016</a:t>
+              <a:t>13/10/2016</a:t>
             </a:fld>
             <a:endParaRPr lang="pt-BR"/>
           </a:p>
@@ -1992,7 +1992,7 @@
           <a:p>
             <a:fld id="{F36E7A87-AD80-4CF8-A2FC-E38A060CEB8C}" type="datetimeFigureOut">
               <a:rPr lang="pt-BR" smtClean="0"/>
-              <a:t>10/10/2016</a:t>
+              <a:t>13/10/2016</a:t>
             </a:fld>
             <a:endParaRPr lang="pt-BR"/>
           </a:p>
@@ -2269,7 +2269,7 @@
           <a:p>
             <a:fld id="{F36E7A87-AD80-4CF8-A2FC-E38A060CEB8C}" type="datetimeFigureOut">
               <a:rPr lang="pt-BR" smtClean="0"/>
-              <a:t>10/10/2016</a:t>
+              <a:t>13/10/2016</a:t>
             </a:fld>
             <a:endParaRPr lang="pt-BR"/>
           </a:p>
@@ -2522,7 +2522,7 @@
           <a:p>
             <a:fld id="{F36E7A87-AD80-4CF8-A2FC-E38A060CEB8C}" type="datetimeFigureOut">
               <a:rPr lang="pt-BR" smtClean="0"/>
-              <a:t>10/10/2016</a:t>
+              <a:t>13/10/2016</a:t>
             </a:fld>
             <a:endParaRPr lang="pt-BR"/>
           </a:p>
@@ -2735,7 +2735,7 @@
           <a:p>
             <a:fld id="{F36E7A87-AD80-4CF8-A2FC-E38A060CEB8C}" type="datetimeFigureOut">
               <a:rPr lang="pt-BR" smtClean="0"/>
-              <a:t>10/10/2016</a:t>
+              <a:t>13/10/2016</a:t>
             </a:fld>
             <a:endParaRPr lang="pt-BR"/>
           </a:p>
@@ -6002,20 +6002,175 @@
         </p:nvSpPr>
         <p:spPr/>
         <p:txBody>
-          <a:bodyPr/>
-          <a:lstStyle/>
-          <a:p>
+          <a:bodyPr>
+            <a:normAutofit/>
+          </a:bodyPr>
+          <a:lstStyle/>
+          <a:p>
+            <a:r>
+              <a:rPr lang="pt-BR" b="1" dirty="0" smtClean="0"/>
+              <a:t>Fatiando </a:t>
+            </a:r>
             <a:r>
               <a:rPr lang="pt-BR" b="1" dirty="0"/>
-              <a:t>Fatiando a Terra</a:t>
-            </a:r>
-            <a:endParaRPr lang="pt-BR" dirty="0"/>
+              <a:t>a </a:t>
+            </a:r>
+            <a:r>
+              <a:rPr lang="pt-BR" b="1" dirty="0" smtClean="0"/>
+              <a:t>Terra</a:t>
+            </a:r>
+            <a:endParaRPr lang="pt-BR" b="1" dirty="0"/>
+          </a:p>
+        </p:txBody>
+      </p:sp>
+      <p:sp>
+        <p:nvSpPr>
+          <p:cNvPr id="4" name="CaixaDeTexto 3"/>
+          <p:cNvSpPr txBox="1"/>
+          <p:nvPr/>
+        </p:nvSpPr>
+        <p:spPr>
+          <a:xfrm>
+            <a:off x="625879" y="1412776"/>
+            <a:ext cx="7867642" cy="5262979"/>
+          </a:xfrm>
+          <a:prstGeom prst="rect">
+            <a:avLst/>
+          </a:prstGeom>
+          <a:noFill/>
+        </p:spPr>
+        <p:txBody>
+          <a:bodyPr wrap="square" rtlCol="0">
+            <a:spAutoFit/>
+          </a:bodyPr>
+          <a:lstStyle/>
+          <a:p>
+            <a:pPr algn="ctr"/>
+            <a:r>
+              <a:rPr lang="pt-BR" sz="2800" dirty="0"/>
+              <a:t>O Fatiando a </a:t>
+            </a:r>
+            <a:r>
+              <a:rPr lang="pt-BR" sz="2800" dirty="0" smtClean="0"/>
+              <a:t>Terra (</a:t>
+            </a:r>
+            <a:r>
+              <a:rPr lang="pt-BR" sz="2800" u="sng" dirty="0"/>
+              <a:t>http://</a:t>
+            </a:r>
+            <a:r>
+              <a:rPr lang="pt-BR" sz="2800" u="sng" dirty="0" smtClean="0"/>
+              <a:t>www.fatiando.org/index.html</a:t>
+            </a:r>
+            <a:r>
+              <a:rPr lang="pt-BR" sz="2800" dirty="0" smtClean="0"/>
+              <a:t>)</a:t>
+            </a:r>
+            <a:r>
+              <a:rPr lang="pt-BR" sz="2800" dirty="0"/>
+              <a:t> é uma biblioteca de acesso livre que é desenvolvida em linguagem </a:t>
+            </a:r>
+            <a:r>
+              <a:rPr lang="pt-BR" sz="2800" dirty="0" smtClean="0"/>
+              <a:t>Python</a:t>
+            </a:r>
+          </a:p>
+          <a:p>
+            <a:pPr algn="ctr"/>
+            <a:endParaRPr lang="pt-BR" sz="2800" dirty="0"/>
+          </a:p>
+          <a:p>
+            <a:pPr algn="ctr"/>
+            <a:r>
+              <a:rPr lang="pt-BR" sz="2800" dirty="0" smtClean="0"/>
+              <a:t>Esta </a:t>
+            </a:r>
+            <a:r>
+              <a:rPr lang="pt-BR" sz="2800" dirty="0"/>
+              <a:t>biblioteca possibilita a modelagem a inversão de dados </a:t>
+            </a:r>
+            <a:r>
+              <a:rPr lang="pt-BR" sz="2800" dirty="0" smtClean="0"/>
+              <a:t>geofísicos</a:t>
+            </a:r>
+          </a:p>
+          <a:p>
+            <a:pPr algn="ctr"/>
+            <a:endParaRPr lang="pt-BR" sz="2800" dirty="0"/>
+          </a:p>
+          <a:p>
+            <a:pPr algn="ctr"/>
+            <a:r>
+              <a:rPr lang="pt-BR" sz="2800" dirty="0" smtClean="0"/>
+              <a:t>Os </a:t>
+            </a:r>
+            <a:r>
+              <a:rPr lang="pt-BR" sz="2800" dirty="0"/>
+              <a:t>códigos desenvolvidos neste minicurso utilizam esta biblioteca e, portanto, é necessário instalá-la para poder rodá-los. Para tanto, siga as instruções no link </a:t>
+            </a:r>
+            <a:r>
+              <a:rPr lang="pt-BR" sz="2800" u="sng" dirty="0"/>
+              <a:t>http://www.fatiando.org/install.html</a:t>
+            </a:r>
+            <a:r>
+              <a:rPr lang="pt-BR" sz="2800" u="sng" dirty="0" smtClean="0"/>
+              <a:t>#</a:t>
+            </a:r>
+            <a:endParaRPr lang="pt-BR" sz="2800" dirty="0"/>
+          </a:p>
+        </p:txBody>
+      </p:sp>
+      <p:sp>
+        <p:nvSpPr>
+          <p:cNvPr id="5" name="Retângulo 4"/>
+          <p:cNvSpPr/>
+          <p:nvPr/>
+        </p:nvSpPr>
+        <p:spPr>
+          <a:xfrm>
+            <a:off x="122940" y="3412039"/>
+            <a:ext cx="8712968" cy="3336995"/>
+          </a:xfrm>
+          <a:prstGeom prst="rect">
+            <a:avLst/>
+          </a:prstGeom>
+          <a:solidFill>
+            <a:schemeClr val="bg1">
+              <a:alpha val="60000"/>
+            </a:schemeClr>
+          </a:solidFill>
+          <a:ln>
+            <a:noFill/>
+          </a:ln>
+        </p:spPr>
+        <p:style>
+          <a:lnRef idx="2">
+            <a:schemeClr val="accent1">
+              <a:shade val="50000"/>
+            </a:schemeClr>
+          </a:lnRef>
+          <a:fillRef idx="1">
+            <a:schemeClr val="accent1"/>
+          </a:fillRef>
+          <a:effectRef idx="0">
+            <a:schemeClr val="accent1"/>
+          </a:effectRef>
+          <a:fontRef idx="minor">
+            <a:schemeClr val="lt1"/>
+          </a:fontRef>
+        </p:style>
+        <p:txBody>
+          <a:bodyPr rtlCol="0" anchor="ctr"/>
+          <a:lstStyle/>
+          <a:p>
+            <a:pPr algn="ctr"/>
+            <a:endParaRPr lang="pt-BR"/>
           </a:p>
         </p:txBody>
       </p:sp>
       <p:pic>
         <p:nvPicPr>
-          <p:cNvPr id="4" name="Picture 2"/>
+          <p:cNvPr id="6" name="Picture 2"/>
           <p:cNvPicPr>
             <a:picLocks noChangeAspect="1" noChangeArrowheads="1"/>
           </p:cNvPicPr>
@@ -6034,8 +6189,8 @@
         </p:blipFill>
         <p:spPr bwMode="auto">
           <a:xfrm>
-            <a:off x="237732" y="2060851"/>
-            <a:ext cx="8640000" cy="4048984"/>
+            <a:off x="1165382" y="3283596"/>
+            <a:ext cx="6826012" cy="3198890"/>
           </a:xfrm>
           <a:prstGeom prst="rect">
             <a:avLst/>
@@ -6068,7 +6223,7 @@
     </p:spTree>
     <p:extLst>
       <p:ext uri="{BB962C8B-B14F-4D97-AF65-F5344CB8AC3E}">
-        <p14:creationId xmlns:p14="http://schemas.microsoft.com/office/powerpoint/2010/main" val="2896038441"/>
+        <p14:creationId xmlns:p14="http://schemas.microsoft.com/office/powerpoint/2010/main" val="1533984594"/>
       </p:ext>
     </p:extLst>
   </p:cSld>

</xml_diff>